<commit_message>
+ ‘sse/postfix/postfix-mailgateway-debian.pdf’ / ‘sse/postfix/postfix-mailgateway-debian.pptx’
</commit_message>
<xml_diff>
--- a/sse/postfix/postfix-mailgateway-debian.pptx
+++ b/sse/postfix/postfix-mailgateway-debian.pptx
@@ -5,7 +5,7 @@
     <p:sldMasterId id="2147483648" r:id="rId1"/>
   </p:sldMasterIdLst>
   <p:notesMasterIdLst>
-    <p:notesMasterId r:id="rId42"/>
+    <p:notesMasterId r:id="rId43"/>
   </p:notesMasterIdLst>
   <p:sldIdLst>
     <p:sldId id="272" r:id="rId2"/>
@@ -39,15 +39,16 @@
     <p:sldId id="271" r:id="rId30"/>
     <p:sldId id="283" r:id="rId31"/>
     <p:sldId id="294" r:id="rId32"/>
-    <p:sldId id="296" r:id="rId33"/>
-    <p:sldId id="299" r:id="rId34"/>
-    <p:sldId id="297" r:id="rId35"/>
-    <p:sldId id="295" r:id="rId36"/>
-    <p:sldId id="298" r:id="rId37"/>
-    <p:sldId id="301" r:id="rId38"/>
-    <p:sldId id="302" r:id="rId39"/>
-    <p:sldId id="303" r:id="rId40"/>
-    <p:sldId id="300" r:id="rId41"/>
+    <p:sldId id="306" r:id="rId33"/>
+    <p:sldId id="296" r:id="rId34"/>
+    <p:sldId id="299" r:id="rId35"/>
+    <p:sldId id="297" r:id="rId36"/>
+    <p:sldId id="295" r:id="rId37"/>
+    <p:sldId id="298" r:id="rId38"/>
+    <p:sldId id="301" r:id="rId39"/>
+    <p:sldId id="302" r:id="rId40"/>
+    <p:sldId id="303" r:id="rId41"/>
+    <p:sldId id="300" r:id="rId42"/>
   </p:sldIdLst>
   <p:sldSz cx="9144000" cy="6858000" type="screen4x3"/>
   <p:notesSz cx="6858000" cy="9144000"/>
@@ -231,7 +232,7 @@
           <a:p>
             <a:fld id="{3CDDD312-3C54-154A-A944-ECEAD81BA00E}" type="datetimeFigureOut">
               <a:rPr lang="en-US" smtClean="0"/>
-              <a:t>5/27/15</a:t>
+              <a:t>5/28/15</a:t>
             </a:fld>
             <a:endParaRPr lang="en-US"/>
           </a:p>
@@ -680,7 +681,7 @@
           <a:p>
             <a:fld id="{CB159958-E3CC-D940-BCDE-C01D88A3AF1B}" type="datetimeFigureOut">
               <a:rPr lang="en-US" smtClean="0"/>
-              <a:t>5/27/15</a:t>
+              <a:t>5/28/15</a:t>
             </a:fld>
             <a:endParaRPr lang="en-US"/>
           </a:p>
@@ -850,7 +851,7 @@
           <a:p>
             <a:fld id="{CB159958-E3CC-D940-BCDE-C01D88A3AF1B}" type="datetimeFigureOut">
               <a:rPr lang="en-US" smtClean="0"/>
-              <a:t>5/27/15</a:t>
+              <a:t>5/28/15</a:t>
             </a:fld>
             <a:endParaRPr lang="en-US"/>
           </a:p>
@@ -1030,7 +1031,7 @@
           <a:p>
             <a:fld id="{CB159958-E3CC-D940-BCDE-C01D88A3AF1B}" type="datetimeFigureOut">
               <a:rPr lang="en-US" smtClean="0"/>
-              <a:t>5/27/15</a:t>
+              <a:t>5/28/15</a:t>
             </a:fld>
             <a:endParaRPr lang="en-US"/>
           </a:p>
@@ -1200,7 +1201,7 @@
           <a:p>
             <a:fld id="{CB159958-E3CC-D940-BCDE-C01D88A3AF1B}" type="datetimeFigureOut">
               <a:rPr lang="en-US" smtClean="0"/>
-              <a:t>5/27/15</a:t>
+              <a:t>5/28/15</a:t>
             </a:fld>
             <a:endParaRPr lang="en-US"/>
           </a:p>
@@ -1446,7 +1447,7 @@
           <a:p>
             <a:fld id="{CB159958-E3CC-D940-BCDE-C01D88A3AF1B}" type="datetimeFigureOut">
               <a:rPr lang="en-US" smtClean="0"/>
-              <a:t>5/27/15</a:t>
+              <a:t>5/28/15</a:t>
             </a:fld>
             <a:endParaRPr lang="en-US"/>
           </a:p>
@@ -1734,7 +1735,7 @@
           <a:p>
             <a:fld id="{CB159958-E3CC-D940-BCDE-C01D88A3AF1B}" type="datetimeFigureOut">
               <a:rPr lang="en-US" smtClean="0"/>
-              <a:t>5/27/15</a:t>
+              <a:t>5/28/15</a:t>
             </a:fld>
             <a:endParaRPr lang="en-US"/>
           </a:p>
@@ -2156,7 +2157,7 @@
           <a:p>
             <a:fld id="{CB159958-E3CC-D940-BCDE-C01D88A3AF1B}" type="datetimeFigureOut">
               <a:rPr lang="en-US" smtClean="0"/>
-              <a:t>5/27/15</a:t>
+              <a:t>5/28/15</a:t>
             </a:fld>
             <a:endParaRPr lang="en-US"/>
           </a:p>
@@ -2274,7 +2275,7 @@
           <a:p>
             <a:fld id="{CB159958-E3CC-D940-BCDE-C01D88A3AF1B}" type="datetimeFigureOut">
               <a:rPr lang="en-US" smtClean="0"/>
-              <a:t>5/27/15</a:t>
+              <a:t>5/28/15</a:t>
             </a:fld>
             <a:endParaRPr lang="en-US"/>
           </a:p>
@@ -2369,7 +2370,7 @@
           <a:p>
             <a:fld id="{CB159958-E3CC-D940-BCDE-C01D88A3AF1B}" type="datetimeFigureOut">
               <a:rPr lang="en-US" smtClean="0"/>
-              <a:t>5/27/15</a:t>
+              <a:t>5/28/15</a:t>
             </a:fld>
             <a:endParaRPr lang="en-US"/>
           </a:p>
@@ -2646,7 +2647,7 @@
           <a:p>
             <a:fld id="{CB159958-E3CC-D940-BCDE-C01D88A3AF1B}" type="datetimeFigureOut">
               <a:rPr lang="en-US" smtClean="0"/>
-              <a:t>5/27/15</a:t>
+              <a:t>5/28/15</a:t>
             </a:fld>
             <a:endParaRPr lang="en-US"/>
           </a:p>
@@ -2899,7 +2900,7 @@
           <a:p>
             <a:fld id="{CB159958-E3CC-D940-BCDE-C01D88A3AF1B}" type="datetimeFigureOut">
               <a:rPr lang="en-US" smtClean="0"/>
-              <a:t>5/27/15</a:t>
+              <a:t>5/28/15</a:t>
             </a:fld>
             <a:endParaRPr lang="en-US"/>
           </a:p>
@@ -3112,7 +3113,7 @@
           <a:p>
             <a:fld id="{CB159958-E3CC-D940-BCDE-C01D88A3AF1B}" type="datetimeFigureOut">
               <a:rPr lang="en-US" smtClean="0"/>
-              <a:t>5/27/15</a:t>
+              <a:t>5/28/15</a:t>
             </a:fld>
             <a:endParaRPr lang="en-US"/>
           </a:p>
@@ -3504,15 +3505,7 @@
           <a:p>
             <a:r>
               <a:rPr lang="en-US" b="1" dirty="0" smtClean="0"/>
-              <a:t>Some Email </a:t>
-            </a:r>
-            <a:r>
-              <a:rPr lang="en-US" b="1" dirty="0" smtClean="0"/>
-              <a:t>Best </a:t>
-            </a:r>
-            <a:r>
-              <a:rPr lang="en-US" b="1" dirty="0" smtClean="0"/>
-              <a:t>Practices</a:t>
+              <a:t>Some Email Best Practices</a:t>
             </a:r>
             <a:endParaRPr lang="en-US" b="1" dirty="0"/>
           </a:p>
@@ -3807,7 +3800,6 @@
               <a:rPr lang="en-US" dirty="0" smtClean="0"/>
               <a:t>Passphrases are even better, more difficult to break </a:t>
             </a:r>
-            <a:endParaRPr lang="en-US" dirty="0" smtClean="0"/>
           </a:p>
           <a:p>
             <a:r>
@@ -3903,15 +3895,7 @@
           <a:p>
             <a:r>
               <a:rPr lang="en-US" dirty="0" smtClean="0"/>
-              <a:t>Have multiple MX records so that your server is not the </a:t>
-            </a:r>
-            <a:r>
-              <a:rPr lang="en-US" dirty="0" smtClean="0"/>
-              <a:t>only one </a:t>
-            </a:r>
-            <a:r>
-              <a:rPr lang="en-US" dirty="0" smtClean="0"/>
-              <a:t>able to receive mail for you</a:t>
+              <a:t>Have multiple MX records so that your server is not the only one able to receive mail for you</a:t>
             </a:r>
           </a:p>
           <a:p>
@@ -4033,7 +4017,6 @@
               <a:rPr lang="en-US" dirty="0" smtClean="0"/>
               <a:t>Wikipedia and Google </a:t>
             </a:r>
-            <a:endParaRPr lang="en-US" dirty="0" smtClean="0"/>
           </a:p>
           <a:p>
             <a:r>
@@ -4046,7 +4029,6 @@
               <a:rPr lang="en-US" dirty="0" smtClean="0"/>
               <a:t> </a:t>
             </a:r>
-            <a:endParaRPr lang="en-US" dirty="0" smtClean="0"/>
           </a:p>
           <a:p>
             <a:r>
@@ -4877,11 +4859,7 @@
             </a:r>
             <a:r>
               <a:rPr lang="en-US" b="1" dirty="0" smtClean="0"/>
-              <a:t> apt-get </a:t>
-            </a:r>
-            <a:r>
-              <a:rPr lang="en-US" b="1" dirty="0" smtClean="0"/>
-              <a:t>install postfix</a:t>
+              <a:t> apt-get install postfix</a:t>
             </a:r>
           </a:p>
           <a:p>
@@ -6699,10 +6677,6 @@
               <a:rPr lang="en-US" dirty="0" smtClean="0"/>
               <a:t>top</a:t>
             </a:r>
-            <a:r>
-              <a:rPr lang="en-US" dirty="0" smtClean="0"/>
-              <a:t/>
-            </a:r>
             <a:br>
               <a:rPr lang="en-US" dirty="0" smtClean="0"/>
             </a:br>
@@ -6967,7 +6941,6 @@
               <a:rPr lang="en-US" dirty="0"/>
               <a:t> not otherwise required for e-mail delivery. </a:t>
             </a:r>
-            <a:endParaRPr lang="en-US" dirty="0"/>
           </a:p>
         </p:txBody>
       </p:sp>
@@ -7112,7 +7085,6 @@
               <a:rPr lang="en-US" dirty="0" smtClean="0"/>
               <a:t>A software/service/appliance that is able to receive and filter emails before they reach the email boxes</a:t>
             </a:r>
-            <a:endParaRPr lang="en-US" dirty="0" smtClean="0"/>
           </a:p>
           <a:p>
             <a:r>
@@ -7125,14 +7097,12 @@
               <a:rPr lang="en-US" dirty="0" smtClean="0"/>
               <a:t>The purpose is to remove dangerous or harmful content (like spam and viruses) on email before they reach user boxes</a:t>
             </a:r>
-            <a:endParaRPr lang="en-US" dirty="0" smtClean="0"/>
           </a:p>
           <a:p>
             <a:r>
               <a:rPr lang="en-US" dirty="0" smtClean="0"/>
               <a:t>A mail filter can process incoming emails and or outgoing emails</a:t>
             </a:r>
-            <a:endParaRPr lang="en-US" dirty="0" smtClean="0"/>
           </a:p>
         </p:txBody>
       </p:sp>
@@ -7183,61 +7153,46 @@
           <a:p>
             <a:r>
               <a:rPr lang="en-US" b="1" dirty="0" smtClean="0"/>
-              <a:t>Advantages</a:t>
+              <a:t>Typical Setup</a:t>
             </a:r>
             <a:endParaRPr lang="en-US" b="1" dirty="0"/>
           </a:p>
         </p:txBody>
       </p:sp>
-      <p:sp>
-        <p:nvSpPr>
-          <p:cNvPr id="3" name="Content Placeholder 2"/>
-          <p:cNvSpPr>
-            <a:spLocks noGrp="1"/>
-          </p:cNvSpPr>
-          <p:nvPr>
-            <p:ph idx="1"/>
-          </p:nvPr>
-        </p:nvSpPr>
-        <p:spPr/>
-        <p:txBody>
-          <a:bodyPr>
-            <a:normAutofit fontScale="92500" lnSpcReduction="10000"/>
-          </a:bodyPr>
-          <a:lstStyle/>
-          <a:p>
-            <a:r>
-              <a:rPr lang="en-US" dirty="0" smtClean="0"/>
-              <a:t>Remove harmful email before it reaches mail boxes</a:t>
-            </a:r>
-          </a:p>
-          <a:p>
-            <a:r>
-              <a:rPr lang="en-US" dirty="0" smtClean="0"/>
-              <a:t>Remove the work of filtering email from the server that is handling email boxes</a:t>
-            </a:r>
-          </a:p>
-          <a:p>
-            <a:r>
-              <a:rPr lang="en-US" dirty="0" smtClean="0"/>
-              <a:t>Highly configurable and can block emails based on a number of criteria including content that is in the body of the email</a:t>
-            </a:r>
-          </a:p>
-          <a:p>
-            <a:r>
-              <a:rPr lang="en-US" dirty="0" smtClean="0"/>
-              <a:t>If hosted outside the network, can reduce load on the network connection/link (also known as far side scrubbing)</a:t>
-            </a:r>
-          </a:p>
-          <a:p>
-            <a:endParaRPr lang="en-US" dirty="0"/>
-          </a:p>
-        </p:txBody>
-      </p:sp>
+      <p:pic>
+        <p:nvPicPr>
+          <p:cNvPr id="4" name="Picture 3" descr="Screen Shot 2015-05-28 at 11.05.21 AM.png"/>
+          <p:cNvPicPr>
+            <a:picLocks noChangeAspect="1"/>
+          </p:cNvPicPr>
+          <p:nvPr/>
+        </p:nvPicPr>
+        <p:blipFill>
+          <a:blip r:embed="rId2">
+            <a:extLst>
+              <a:ext uri="{28A0092B-C50C-407E-A947-70E740481C1C}">
+                <a14:useLocalDpi xmlns:a14="http://schemas.microsoft.com/office/drawing/2010/main" val="0"/>
+              </a:ext>
+            </a:extLst>
+          </a:blip>
+          <a:stretch>
+            <a:fillRect/>
+          </a:stretch>
+        </p:blipFill>
+        <p:spPr>
+          <a:xfrm>
+            <a:off x="1034529" y="2413000"/>
+            <a:ext cx="6565900" cy="2032000"/>
+          </a:xfrm>
+          <a:prstGeom prst="rect">
+            <a:avLst/>
+          </a:prstGeom>
+        </p:spPr>
+      </p:pic>
     </p:spTree>
     <p:extLst>
       <p:ext uri="{BB962C8B-B14F-4D97-AF65-F5344CB8AC3E}">
-        <p14:creationId xmlns:p14="http://schemas.microsoft.com/office/powerpoint/2010/main" val="3762031849"/>
+        <p14:creationId xmlns:p14="http://schemas.microsoft.com/office/powerpoint/2010/main" val="3243458218"/>
       </p:ext>
     </p:extLst>
   </p:cSld>
@@ -7281,7 +7236,7 @@
           <a:p>
             <a:r>
               <a:rPr lang="en-US" b="1" dirty="0" smtClean="0"/>
-              <a:t>Disadvantage</a:t>
+              <a:t>Advantages</a:t>
             </a:r>
             <a:endParaRPr lang="en-US" b="1" dirty="0"/>
           </a:p>
@@ -7299,32 +7254,35 @@
         </p:nvSpPr>
         <p:spPr/>
         <p:txBody>
-          <a:bodyPr/>
-          <a:lstStyle/>
-          <a:p>
-            <a:r>
-              <a:rPr lang="en-US" dirty="0" smtClean="0"/>
-              <a:t>Mistakes in configuration may mean mail is not delivered. They are highly </a:t>
-            </a:r>
-            <a:r>
-              <a:rPr lang="en-US" dirty="0" err="1" smtClean="0"/>
-              <a:t>customisable</a:t>
-            </a:r>
-            <a:r>
-              <a:rPr lang="en-US" dirty="0" smtClean="0"/>
-              <a:t> with hundreds of options and parameters which you must be careful with</a:t>
-            </a:r>
-          </a:p>
-          <a:p>
-            <a:r>
-              <a:rPr lang="en-US" dirty="0" smtClean="0"/>
-              <a:t>Increase the number of email servers to be managed</a:t>
-            </a:r>
-          </a:p>
-          <a:p>
-            <a:pPr marL="0" indent="0">
-              <a:buNone/>
-            </a:pPr>
+          <a:bodyPr>
+            <a:normAutofit fontScale="92500" lnSpcReduction="10000"/>
+          </a:bodyPr>
+          <a:lstStyle/>
+          <a:p>
+            <a:r>
+              <a:rPr lang="en-US" dirty="0" smtClean="0"/>
+              <a:t>Remove harmful email before it reaches mail boxes</a:t>
+            </a:r>
+          </a:p>
+          <a:p>
+            <a:r>
+              <a:rPr lang="en-US" dirty="0" smtClean="0"/>
+              <a:t>Remove the work of filtering email from the server that is handling email boxes</a:t>
+            </a:r>
+          </a:p>
+          <a:p>
+            <a:r>
+              <a:rPr lang="en-US" dirty="0" smtClean="0"/>
+              <a:t>Highly configurable and can block emails based on a number of criteria including content that is in the body of the email</a:t>
+            </a:r>
+          </a:p>
+          <a:p>
+            <a:r>
+              <a:rPr lang="en-US" dirty="0" smtClean="0"/>
+              <a:t>If hosted outside the network, can reduce load on the network connection/link (also known as far side scrubbing)</a:t>
+            </a:r>
+          </a:p>
+          <a:p>
             <a:endParaRPr lang="en-US" dirty="0"/>
           </a:p>
         </p:txBody>
@@ -7332,7 +7290,7 @@
     </p:spTree>
     <p:extLst>
       <p:ext uri="{BB962C8B-B14F-4D97-AF65-F5344CB8AC3E}">
-        <p14:creationId xmlns:p14="http://schemas.microsoft.com/office/powerpoint/2010/main" val="2756647032"/>
+        <p14:creationId xmlns:p14="http://schemas.microsoft.com/office/powerpoint/2010/main" val="3762031849"/>
       </p:ext>
     </p:extLst>
   </p:cSld>
@@ -7369,21 +7327,14 @@
             <p:ph type="title"/>
           </p:nvPr>
         </p:nvSpPr>
-        <p:spPr>
-          <a:xfrm>
-            <a:off x="457200" y="156334"/>
-            <a:ext cx="8229600" cy="1143000"/>
-          </a:xfrm>
-        </p:spPr>
-        <p:txBody>
-          <a:bodyPr>
-            <a:normAutofit fontScale="90000"/>
-          </a:bodyPr>
+        <p:spPr/>
+        <p:txBody>
+          <a:bodyPr/>
           <a:lstStyle/>
           <a:p>
             <a:r>
               <a:rPr lang="en-US" b="1" dirty="0" smtClean="0"/>
-              <a:t>Common tools used in Mail Gateways</a:t>
+              <a:t>Disadvantage</a:t>
             </a:r>
             <a:endParaRPr lang="en-US" b="1" dirty="0"/>
           </a:p>
@@ -7399,125 +7350,34 @@
             <p:ph idx="1"/>
           </p:nvPr>
         </p:nvSpPr>
-        <p:spPr>
-          <a:xfrm>
-            <a:off x="457200" y="1299334"/>
-            <a:ext cx="8229600" cy="4826829"/>
-          </a:xfrm>
-        </p:spPr>
-        <p:txBody>
-          <a:bodyPr>
-            <a:normAutofit fontScale="92500" lnSpcReduction="20000"/>
-          </a:bodyPr>
-          <a:lstStyle/>
-          <a:p>
+        <p:spPr/>
+        <p:txBody>
+          <a:bodyPr/>
+          <a:lstStyle/>
+          <a:p>
+            <a:r>
+              <a:rPr lang="en-US" dirty="0" smtClean="0"/>
+              <a:t>Mistakes in configuration may mean mail is not delivered. They are highly </a:t>
+            </a:r>
             <a:r>
               <a:rPr lang="en-US" dirty="0" err="1" smtClean="0"/>
-              <a:t>Spamassassin</a:t>
-            </a:r>
-            <a:r>
-              <a:rPr lang="en-US" dirty="0" smtClean="0"/>
-              <a:t> – No. 1 </a:t>
-            </a:r>
-            <a:r>
-              <a:rPr lang="en-US" dirty="0"/>
-              <a:t>Open Source anti-spam platform giving system administrators a filter to classify email and block spam (unsolicited bulk email</a:t>
-            </a:r>
-            <a:r>
-              <a:rPr lang="en-US" dirty="0" smtClean="0"/>
-              <a:t>)</a:t>
-            </a:r>
-          </a:p>
-          <a:p>
-            <a:r>
-              <a:rPr lang="en-US" dirty="0" err="1" smtClean="0"/>
-              <a:t>ClamAV</a:t>
-            </a:r>
-            <a:r>
-              <a:rPr lang="en-US" dirty="0" smtClean="0"/>
-              <a:t> – Virus scanning software. Can be used for </a:t>
-            </a:r>
-            <a:r>
-              <a:rPr lang="en-US" dirty="0"/>
-              <a:t>email </a:t>
-            </a:r>
-            <a:r>
-              <a:rPr lang="en-US" dirty="0" smtClean="0"/>
-              <a:t>scanning</a:t>
-            </a:r>
-            <a:r>
-              <a:rPr lang="en-US" dirty="0"/>
-              <a:t> </a:t>
-            </a:r>
-            <a:r>
-              <a:rPr lang="en-US" dirty="0" smtClean="0"/>
-              <a:t>and web scanning</a:t>
-            </a:r>
-          </a:p>
-          <a:p>
-            <a:r>
-              <a:rPr lang="en-US" dirty="0" err="1" smtClean="0"/>
-              <a:t>Amavisd</a:t>
-            </a:r>
-            <a:r>
-              <a:rPr lang="en-US" dirty="0" smtClean="0"/>
-              <a:t> – interface between the MTA and the above tools. </a:t>
-            </a:r>
-            <a:r>
-              <a:rPr lang="en-US" dirty="0"/>
-              <a:t>A common mail filtering installation with </a:t>
-            </a:r>
-            <a:r>
-              <a:rPr lang="en-US" i="1" dirty="0" err="1"/>
-              <a:t>Amavis</a:t>
-            </a:r>
-            <a:r>
-              <a:rPr lang="en-US" dirty="0"/>
-              <a:t> consists of </a:t>
-            </a:r>
-            <a:r>
-              <a:rPr lang="en-US" dirty="0" smtClean="0"/>
-              <a:t>an MTA, </a:t>
-            </a:r>
-            <a:r>
-              <a:rPr lang="en-US" dirty="0" err="1" smtClean="0"/>
-              <a:t>ClamAV</a:t>
-            </a:r>
-            <a:r>
-              <a:rPr lang="en-US" dirty="0" smtClean="0"/>
-              <a:t> and </a:t>
-            </a:r>
-            <a:r>
-              <a:rPr lang="en-US" dirty="0" err="1" smtClean="0"/>
-              <a:t>Spamassassin</a:t>
-            </a:r>
-            <a:endParaRPr lang="en-US" dirty="0"/>
-          </a:p>
-          <a:p>
-            <a:r>
-              <a:rPr lang="en-US" dirty="0" err="1" smtClean="0"/>
-              <a:t>MailScanner</a:t>
-            </a:r>
-            <a:r>
-              <a:rPr lang="en-US" dirty="0" smtClean="0"/>
-              <a:t> - </a:t>
-            </a:r>
-            <a:r>
-              <a:rPr lang="en-US" dirty="0"/>
-              <a:t>open source email security system design for Linux-based email </a:t>
-            </a:r>
-            <a:r>
-              <a:rPr lang="en-US" dirty="0" smtClean="0"/>
-              <a:t>gateways</a:t>
-            </a:r>
-          </a:p>
-          <a:p>
-            <a:endParaRPr lang="en-US" dirty="0"/>
-          </a:p>
-          <a:p>
-            <a:endParaRPr lang="en-US" dirty="0" smtClean="0"/>
-          </a:p>
-          <a:p>
+              <a:t>customisable</a:t>
+            </a:r>
+            <a:r>
+              <a:rPr lang="en-US" dirty="0" smtClean="0"/>
+              <a:t> with hundreds of options and parameters which you must be careful with</a:t>
+            </a:r>
+          </a:p>
+          <a:p>
+            <a:r>
+              <a:rPr lang="en-US" dirty="0" smtClean="0"/>
+              <a:t>Increase the number of email servers to be managed</a:t>
+            </a:r>
+          </a:p>
+          <a:p>
+            <a:pPr marL="0" indent="0">
+              <a:buNone/>
+            </a:pPr>
             <a:endParaRPr lang="en-US" dirty="0"/>
           </a:p>
         </p:txBody>
@@ -7525,7 +7385,7 @@
     </p:spTree>
     <p:extLst>
       <p:ext uri="{BB962C8B-B14F-4D97-AF65-F5344CB8AC3E}">
-        <p14:creationId xmlns:p14="http://schemas.microsoft.com/office/powerpoint/2010/main" val="3027278549"/>
+        <p14:creationId xmlns:p14="http://schemas.microsoft.com/office/powerpoint/2010/main" val="2756647032"/>
       </p:ext>
     </p:extLst>
   </p:cSld>
@@ -7562,14 +7422,21 @@
             <p:ph type="title"/>
           </p:nvPr>
         </p:nvSpPr>
-        <p:spPr/>
-        <p:txBody>
-          <a:bodyPr/>
+        <p:spPr>
+          <a:xfrm>
+            <a:off x="457200" y="156334"/>
+            <a:ext cx="8229600" cy="1143000"/>
+          </a:xfrm>
+        </p:spPr>
+        <p:txBody>
+          <a:bodyPr>
+            <a:normAutofit fontScale="90000"/>
+          </a:bodyPr>
           <a:lstStyle/>
           <a:p>
             <a:r>
               <a:rPr lang="en-US" b="1" dirty="0" smtClean="0"/>
-              <a:t>Mail Gateway Appliances</a:t>
+              <a:t>Common tools used in Mail Gateways</a:t>
             </a:r>
             <a:endParaRPr lang="en-US" b="1" dirty="0"/>
           </a:p>
@@ -7585,114 +7452,125 @@
             <p:ph idx="1"/>
           </p:nvPr>
         </p:nvSpPr>
-        <p:spPr/>
-        <p:txBody>
-          <a:bodyPr/>
-          <a:lstStyle/>
-          <a:p>
-            <a:pPr marL="0" indent="0">
-              <a:buNone/>
-            </a:pPr>
-            <a:r>
-              <a:rPr lang="en-US" dirty="0" smtClean="0"/>
-              <a:t>These are solutions that can be installed on servers and provide Mail Gateway services</a:t>
-            </a:r>
-          </a:p>
-          <a:p>
-            <a:r>
-              <a:rPr lang="en-US" dirty="0" smtClean="0"/>
-              <a:t>Anti Spam SMTP </a:t>
+        <p:spPr>
+          <a:xfrm>
+            <a:off x="457200" y="1299334"/>
+            <a:ext cx="8229600" cy="4826829"/>
+          </a:xfrm>
+        </p:spPr>
+        <p:txBody>
+          <a:bodyPr>
+            <a:normAutofit fontScale="92500" lnSpcReduction="20000"/>
+          </a:bodyPr>
+          <a:lstStyle/>
+          <a:p>
+            <a:r>
+              <a:rPr lang="en-US" dirty="0" err="1" smtClean="0"/>
+              <a:t>Spamassassin</a:t>
+            </a:r>
+            <a:r>
+              <a:rPr lang="en-US" dirty="0" smtClean="0"/>
+              <a:t> – No. 1 </a:t>
             </a:r>
             <a:r>
               <a:rPr lang="en-US" dirty="0"/>
-              <a:t>Proxy - </a:t>
-            </a:r>
-            <a:r>
-              <a:rPr lang="en-US" dirty="0">
-                <a:hlinkClick r:id="rId2"/>
-              </a:rPr>
-              <a:t>http://en.wikipedia.org/wiki/Anti-</a:t>
-            </a:r>
-            <a:r>
-              <a:rPr lang="en-US" dirty="0" smtClean="0">
-                <a:hlinkClick r:id="rId2"/>
-              </a:rPr>
-              <a:t>Spam_SMTP_Proxy</a:t>
-            </a:r>
-            <a:r>
-              <a:rPr lang="en-US" dirty="0" smtClean="0"/>
+              <a:t>Open Source anti-spam platform giving system administrators a filter to classify email and block spam (unsolicited bulk email</a:t>
+            </a:r>
+            <a:r>
+              <a:rPr lang="en-US" dirty="0" smtClean="0"/>
+              <a:t>)</a:t>
+            </a:r>
+          </a:p>
+          <a:p>
+            <a:r>
+              <a:rPr lang="en-US" dirty="0" err="1" smtClean="0"/>
+              <a:t>ClamAV</a:t>
+            </a:r>
+            <a:r>
+              <a:rPr lang="en-US" dirty="0" smtClean="0"/>
+              <a:t> – Virus scanning software. Can be used for </a:t>
+            </a:r>
+            <a:r>
+              <a:rPr lang="en-US" dirty="0"/>
+              <a:t>email </a:t>
+            </a:r>
+            <a:r>
+              <a:rPr lang="en-US" dirty="0" smtClean="0"/>
+              <a:t>scanning</a:t>
+            </a:r>
+            <a:r>
+              <a:rPr lang="en-US" dirty="0"/>
               <a:t> </a:t>
             </a:r>
-          </a:p>
-          <a:p>
+            <a:r>
+              <a:rPr lang="en-US" dirty="0" smtClean="0"/>
+              <a:t>and web scanning</a:t>
+            </a:r>
+          </a:p>
+          <a:p>
+            <a:r>
+              <a:rPr lang="en-US" dirty="0" err="1" smtClean="0"/>
+              <a:t>Amavisd</a:t>
+            </a:r>
+            <a:r>
+              <a:rPr lang="en-US" dirty="0" smtClean="0"/>
+              <a:t> – interface between the MTA and the above tools. </a:t>
+            </a:r>
             <a:r>
               <a:rPr lang="en-US" dirty="0"/>
-              <a:t>Mail Border -  </a:t>
-            </a:r>
-            <a:r>
-              <a:rPr lang="en-US" dirty="0">
-                <a:hlinkClick r:id="rId3"/>
-              </a:rPr>
-              <a:t>http://www.mailborder.com</a:t>
-            </a:r>
-            <a:r>
-              <a:rPr lang="en-US" dirty="0" smtClean="0">
-                <a:hlinkClick r:id="rId3"/>
-              </a:rPr>
-              <a:t>/</a:t>
-            </a:r>
-            <a:r>
-              <a:rPr lang="en-US" dirty="0" smtClean="0"/>
-              <a:t> </a:t>
-            </a:r>
-          </a:p>
-          <a:p>
+              <a:t>A common mail filtering installation with </a:t>
+            </a:r>
+            <a:r>
+              <a:rPr lang="en-US" i="1" dirty="0" err="1"/>
+              <a:t>Amavis</a:t>
+            </a:r>
             <a:r>
               <a:rPr lang="en-US" dirty="0"/>
-              <a:t>ScrolloutF1 - </a:t>
-            </a:r>
-            <a:r>
-              <a:rPr lang="en-US" dirty="0">
-                <a:hlinkClick r:id="rId4"/>
-              </a:rPr>
-              <a:t>http://www.scrolloutf1.com</a:t>
-            </a:r>
-            <a:r>
-              <a:rPr lang="en-US" dirty="0" smtClean="0">
-                <a:hlinkClick r:id="rId4"/>
-              </a:rPr>
-              <a:t>/</a:t>
-            </a:r>
-            <a:r>
-              <a:rPr lang="en-US" dirty="0" smtClean="0"/>
-              <a:t> </a:t>
-            </a:r>
-          </a:p>
-          <a:p>
+              <a:t> consists of </a:t>
+            </a:r>
+            <a:r>
+              <a:rPr lang="en-US" dirty="0" smtClean="0"/>
+              <a:t>an MTA, </a:t>
+            </a:r>
             <a:r>
               <a:rPr lang="en-US" dirty="0" err="1" smtClean="0"/>
-              <a:t>Xeams</a:t>
+              <a:t>ClamAV</a:t>
+            </a:r>
+            <a:r>
+              <a:rPr lang="en-US" dirty="0" smtClean="0"/>
+              <a:t> and </a:t>
+            </a:r>
+            <a:r>
+              <a:rPr lang="en-US" dirty="0" err="1" smtClean="0"/>
+              <a:t>Spamassassin</a:t>
+            </a:r>
+            <a:endParaRPr lang="en-US" dirty="0"/>
+          </a:p>
+          <a:p>
+            <a:r>
+              <a:rPr lang="en-US" dirty="0" err="1" smtClean="0"/>
+              <a:t>MailScanner</a:t>
+            </a:r>
+            <a:r>
+              <a:rPr lang="en-US" dirty="0" smtClean="0"/>
+              <a:t> - </a:t>
             </a:r>
             <a:r>
               <a:rPr lang="en-US" dirty="0"/>
-              <a:t> - </a:t>
-            </a:r>
-            <a:r>
-              <a:rPr lang="en-US" dirty="0">
-                <a:hlinkClick r:id="rId5"/>
-              </a:rPr>
-              <a:t>http://www.xeams.com</a:t>
-            </a:r>
-            <a:r>
-              <a:rPr lang="en-US" dirty="0" smtClean="0">
-                <a:hlinkClick r:id="rId5"/>
-              </a:rPr>
-              <a:t>/</a:t>
-            </a:r>
-            <a:r>
-              <a:rPr lang="en-US" dirty="0" smtClean="0"/>
-              <a:t> </a:t>
-            </a:r>
+              <a:t>open source email security system design for Linux-based email </a:t>
+            </a:r>
+            <a:r>
+              <a:rPr lang="en-US" dirty="0" smtClean="0"/>
+              <a:t>gateways</a:t>
+            </a:r>
+          </a:p>
+          <a:p>
+            <a:endParaRPr lang="en-US" dirty="0"/>
+          </a:p>
+          <a:p>
+            <a:endParaRPr lang="en-US" dirty="0" smtClean="0"/>
+          </a:p>
+          <a:p>
             <a:endParaRPr lang="en-US" dirty="0"/>
           </a:p>
         </p:txBody>
@@ -7700,7 +7578,7 @@
     </p:spTree>
     <p:extLst>
       <p:ext uri="{BB962C8B-B14F-4D97-AF65-F5344CB8AC3E}">
-        <p14:creationId xmlns:p14="http://schemas.microsoft.com/office/powerpoint/2010/main" val="3989550600"/>
+        <p14:creationId xmlns:p14="http://schemas.microsoft.com/office/powerpoint/2010/main" val="3027278549"/>
       </p:ext>
     </p:extLst>
   </p:cSld>
@@ -7743,6 +7621,181 @@
           <a:lstStyle/>
           <a:p>
             <a:r>
+              <a:rPr lang="en-US" b="1" dirty="0" smtClean="0"/>
+              <a:t>Mail Gateway Appliances</a:t>
+            </a:r>
+            <a:endParaRPr lang="en-US" b="1" dirty="0"/>
+          </a:p>
+        </p:txBody>
+      </p:sp>
+      <p:sp>
+        <p:nvSpPr>
+          <p:cNvPr id="3" name="Content Placeholder 2"/>
+          <p:cNvSpPr>
+            <a:spLocks noGrp="1"/>
+          </p:cNvSpPr>
+          <p:nvPr>
+            <p:ph idx="1"/>
+          </p:nvPr>
+        </p:nvSpPr>
+        <p:spPr/>
+        <p:txBody>
+          <a:bodyPr/>
+          <a:lstStyle/>
+          <a:p>
+            <a:pPr marL="0" indent="0">
+              <a:buNone/>
+            </a:pPr>
+            <a:r>
+              <a:rPr lang="en-US" dirty="0" smtClean="0"/>
+              <a:t>These are solutions that can be installed on servers and provide Mail Gateway services</a:t>
+            </a:r>
+          </a:p>
+          <a:p>
+            <a:r>
+              <a:rPr lang="en-US" dirty="0" smtClean="0"/>
+              <a:t>Anti Spam SMTP </a:t>
+            </a:r>
+            <a:r>
+              <a:rPr lang="en-US" dirty="0"/>
+              <a:t>Proxy - </a:t>
+            </a:r>
+            <a:r>
+              <a:rPr lang="en-US" dirty="0">
+                <a:hlinkClick r:id="rId2"/>
+              </a:rPr>
+              <a:t>http://en.wikipedia.org/wiki/Anti-</a:t>
+            </a:r>
+            <a:r>
+              <a:rPr lang="en-US" dirty="0" smtClean="0">
+                <a:hlinkClick r:id="rId2"/>
+              </a:rPr>
+              <a:t>Spam_SMTP_Proxy</a:t>
+            </a:r>
+            <a:r>
+              <a:rPr lang="en-US" dirty="0" smtClean="0"/>
+              <a:t> </a:t>
+            </a:r>
+          </a:p>
+          <a:p>
+            <a:r>
+              <a:rPr lang="en-US" dirty="0"/>
+              <a:t>Mail Border -  </a:t>
+            </a:r>
+            <a:r>
+              <a:rPr lang="en-US" dirty="0">
+                <a:hlinkClick r:id="rId3"/>
+              </a:rPr>
+              <a:t>http://www.mailborder.com</a:t>
+            </a:r>
+            <a:r>
+              <a:rPr lang="en-US" dirty="0" smtClean="0">
+                <a:hlinkClick r:id="rId3"/>
+              </a:rPr>
+              <a:t>/</a:t>
+            </a:r>
+            <a:r>
+              <a:rPr lang="en-US" dirty="0" smtClean="0"/>
+              <a:t> </a:t>
+            </a:r>
+          </a:p>
+          <a:p>
+            <a:r>
+              <a:rPr lang="en-US" dirty="0"/>
+              <a:t>ScrolloutF1 - </a:t>
+            </a:r>
+            <a:r>
+              <a:rPr lang="en-US" dirty="0">
+                <a:hlinkClick r:id="rId4"/>
+              </a:rPr>
+              <a:t>http://www.scrolloutf1.com</a:t>
+            </a:r>
+            <a:r>
+              <a:rPr lang="en-US" dirty="0" smtClean="0">
+                <a:hlinkClick r:id="rId4"/>
+              </a:rPr>
+              <a:t>/</a:t>
+            </a:r>
+            <a:r>
+              <a:rPr lang="en-US" dirty="0" smtClean="0"/>
+              <a:t> </a:t>
+            </a:r>
+          </a:p>
+          <a:p>
+            <a:r>
+              <a:rPr lang="en-US" dirty="0" err="1" smtClean="0"/>
+              <a:t>Xeams</a:t>
+            </a:r>
+            <a:r>
+              <a:rPr lang="en-US" dirty="0"/>
+              <a:t> - </a:t>
+            </a:r>
+            <a:r>
+              <a:rPr lang="en-US" dirty="0">
+                <a:hlinkClick r:id="rId5"/>
+              </a:rPr>
+              <a:t>http://www.xeams.com</a:t>
+            </a:r>
+            <a:r>
+              <a:rPr lang="en-US" dirty="0" smtClean="0">
+                <a:hlinkClick r:id="rId5"/>
+              </a:rPr>
+              <a:t>/</a:t>
+            </a:r>
+            <a:r>
+              <a:rPr lang="en-US" dirty="0" smtClean="0"/>
+              <a:t> </a:t>
+            </a:r>
+            <a:endParaRPr lang="en-US" dirty="0"/>
+          </a:p>
+        </p:txBody>
+      </p:sp>
+    </p:spTree>
+    <p:extLst>
+      <p:ext uri="{BB962C8B-B14F-4D97-AF65-F5344CB8AC3E}">
+        <p14:creationId xmlns:p14="http://schemas.microsoft.com/office/powerpoint/2010/main" val="3989550600"/>
+      </p:ext>
+    </p:extLst>
+  </p:cSld>
+  <p:clrMapOvr>
+    <a:masterClrMapping/>
+  </p:clrMapOvr>
+</p:sld>
+</file>
+
+<file path=ppt/slides/slide37.xml><?xml version="1.0" encoding="utf-8"?>
+<p:sld xmlns:a="http://schemas.openxmlformats.org/drawingml/2006/main" xmlns:r="http://schemas.openxmlformats.org/officeDocument/2006/relationships" xmlns:p="http://schemas.openxmlformats.org/presentationml/2006/main">
+  <p:cSld>
+    <p:spTree>
+      <p:nvGrpSpPr>
+        <p:cNvPr id="1" name=""/>
+        <p:cNvGrpSpPr/>
+        <p:nvPr/>
+      </p:nvGrpSpPr>
+      <p:grpSpPr>
+        <a:xfrm>
+          <a:off x="0" y="0"/>
+          <a:ext cx="0" cy="0"/>
+          <a:chOff x="0" y="0"/>
+          <a:chExt cx="0" cy="0"/>
+        </a:xfrm>
+      </p:grpSpPr>
+      <p:sp>
+        <p:nvSpPr>
+          <p:cNvPr id="2" name="Title 1"/>
+          <p:cNvSpPr>
+            <a:spLocks noGrp="1"/>
+          </p:cNvSpPr>
+          <p:nvPr>
+            <p:ph type="title"/>
+          </p:nvPr>
+        </p:nvSpPr>
+        <p:spPr/>
+        <p:txBody>
+          <a:bodyPr/>
+          <a:lstStyle/>
+          <a:p>
+            <a:r>
               <a:rPr lang="en-US" b="1" dirty="0" err="1" smtClean="0"/>
               <a:t>MailScanner</a:t>
             </a:r>
@@ -7856,7 +7909,7 @@
 </p:sld>
 </file>
 
-<file path=ppt/slides/slide37.xml><?xml version="1.0" encoding="utf-8"?>
+<file path=ppt/slides/slide38.xml><?xml version="1.0" encoding="utf-8"?>
 <p:sld xmlns:a="http://schemas.openxmlformats.org/drawingml/2006/main" xmlns:r="http://schemas.openxmlformats.org/officeDocument/2006/relationships" xmlns:p="http://schemas.openxmlformats.org/presentationml/2006/main">
   <p:cSld>
     <p:spTree>
@@ -7916,7 +7969,7 @@
 </p:sld>
 </file>
 
-<file path=ppt/slides/slide38.xml><?xml version="1.0" encoding="utf-8"?>
+<file path=ppt/slides/slide39.xml><?xml version="1.0" encoding="utf-8"?>
 <p:sld xmlns:a="http://schemas.openxmlformats.org/drawingml/2006/main" xmlns:r="http://schemas.openxmlformats.org/officeDocument/2006/relationships" xmlns:p="http://schemas.openxmlformats.org/presentationml/2006/main">
   <p:cSld>
     <p:spTree>
@@ -7976,7 +8029,96 @@
 </p:sld>
 </file>
 
-<file path=ppt/slides/slide39.xml><?xml version="1.0" encoding="utf-8"?>
+<file path=ppt/slides/slide4.xml><?xml version="1.0" encoding="utf-8"?>
+<p:sld xmlns:a="http://schemas.openxmlformats.org/drawingml/2006/main" xmlns:r="http://schemas.openxmlformats.org/officeDocument/2006/relationships" xmlns:p="http://schemas.openxmlformats.org/presentationml/2006/main">
+  <p:cSld>
+    <p:spTree>
+      <p:nvGrpSpPr>
+        <p:cNvPr id="1" name=""/>
+        <p:cNvGrpSpPr/>
+        <p:nvPr/>
+      </p:nvGrpSpPr>
+      <p:grpSpPr>
+        <a:xfrm>
+          <a:off x="0" y="0"/>
+          <a:ext cx="0" cy="0"/>
+          <a:chOff x="0" y="0"/>
+          <a:chExt cx="0" cy="0"/>
+        </a:xfrm>
+      </p:grpSpPr>
+      <p:sp>
+        <p:nvSpPr>
+          <p:cNvPr id="2" name="Title 1"/>
+          <p:cNvSpPr>
+            <a:spLocks noGrp="1"/>
+          </p:cNvSpPr>
+          <p:nvPr>
+            <p:ph type="title"/>
+          </p:nvPr>
+        </p:nvSpPr>
+        <p:spPr/>
+        <p:txBody>
+          <a:bodyPr/>
+          <a:lstStyle/>
+          <a:p>
+            <a:r>
+              <a:rPr lang="en-US" b="1" dirty="0" smtClean="0"/>
+              <a:t>DKIM Part 2</a:t>
+            </a:r>
+            <a:endParaRPr lang="en-US" b="1" dirty="0"/>
+          </a:p>
+        </p:txBody>
+      </p:sp>
+      <p:sp>
+        <p:nvSpPr>
+          <p:cNvPr id="3" name="Content Placeholder 2"/>
+          <p:cNvSpPr>
+            <a:spLocks noGrp="1"/>
+          </p:cNvSpPr>
+          <p:nvPr>
+            <p:ph idx="1"/>
+          </p:nvPr>
+        </p:nvSpPr>
+        <p:spPr/>
+        <p:txBody>
+          <a:bodyPr/>
+          <a:lstStyle/>
+          <a:p>
+            <a:r>
+              <a:rPr lang="en-US" dirty="0"/>
+              <a:t>DKIM allows the signer to distinguish its legitimate mail stream. It does not directly prevent or disclose abusive behavior. </a:t>
+            </a:r>
+            <a:endParaRPr lang="en-US" dirty="0" smtClean="0"/>
+          </a:p>
+          <a:p>
+            <a:r>
+              <a:rPr lang="en-US" dirty="0" smtClean="0"/>
+              <a:t>This </a:t>
+            </a:r>
+            <a:r>
+              <a:rPr lang="en-US" dirty="0"/>
+              <a:t>ability to distinguish legitimate mail from potentially forged mail has benefits for recipients of e-mail as well as senders, and "DKIM awareness" is programmed into some e-mail software.</a:t>
+            </a:r>
+          </a:p>
+          <a:p>
+            <a:endParaRPr lang="en-US" dirty="0"/>
+          </a:p>
+        </p:txBody>
+      </p:sp>
+    </p:spTree>
+    <p:extLst>
+      <p:ext uri="{BB962C8B-B14F-4D97-AF65-F5344CB8AC3E}">
+        <p14:creationId xmlns:p14="http://schemas.microsoft.com/office/powerpoint/2010/main" val="2074389447"/>
+      </p:ext>
+    </p:extLst>
+  </p:cSld>
+  <p:clrMapOvr>
+    <a:masterClrMapping/>
+  </p:clrMapOvr>
+</p:sld>
+</file>
+
+<file path=ppt/slides/slide40.xml><?xml version="1.0" encoding="utf-8"?>
 <p:sld xmlns:a="http://schemas.openxmlformats.org/drawingml/2006/main" xmlns:r="http://schemas.openxmlformats.org/officeDocument/2006/relationships" xmlns:p="http://schemas.openxmlformats.org/presentationml/2006/main">
   <p:cSld>
     <p:spTree>
@@ -8036,96 +8178,7 @@
 </p:sld>
 </file>
 
-<file path=ppt/slides/slide4.xml><?xml version="1.0" encoding="utf-8"?>
-<p:sld xmlns:a="http://schemas.openxmlformats.org/drawingml/2006/main" xmlns:r="http://schemas.openxmlformats.org/officeDocument/2006/relationships" xmlns:p="http://schemas.openxmlformats.org/presentationml/2006/main">
-  <p:cSld>
-    <p:spTree>
-      <p:nvGrpSpPr>
-        <p:cNvPr id="1" name=""/>
-        <p:cNvGrpSpPr/>
-        <p:nvPr/>
-      </p:nvGrpSpPr>
-      <p:grpSpPr>
-        <a:xfrm>
-          <a:off x="0" y="0"/>
-          <a:ext cx="0" cy="0"/>
-          <a:chOff x="0" y="0"/>
-          <a:chExt cx="0" cy="0"/>
-        </a:xfrm>
-      </p:grpSpPr>
-      <p:sp>
-        <p:nvSpPr>
-          <p:cNvPr id="2" name="Title 1"/>
-          <p:cNvSpPr>
-            <a:spLocks noGrp="1"/>
-          </p:cNvSpPr>
-          <p:nvPr>
-            <p:ph type="title"/>
-          </p:nvPr>
-        </p:nvSpPr>
-        <p:spPr/>
-        <p:txBody>
-          <a:bodyPr/>
-          <a:lstStyle/>
-          <a:p>
-            <a:r>
-              <a:rPr lang="en-US" b="1" dirty="0" smtClean="0"/>
-              <a:t>DKIM Part 2</a:t>
-            </a:r>
-            <a:endParaRPr lang="en-US" b="1" dirty="0"/>
-          </a:p>
-        </p:txBody>
-      </p:sp>
-      <p:sp>
-        <p:nvSpPr>
-          <p:cNvPr id="3" name="Content Placeholder 2"/>
-          <p:cNvSpPr>
-            <a:spLocks noGrp="1"/>
-          </p:cNvSpPr>
-          <p:nvPr>
-            <p:ph idx="1"/>
-          </p:nvPr>
-        </p:nvSpPr>
-        <p:spPr/>
-        <p:txBody>
-          <a:bodyPr/>
-          <a:lstStyle/>
-          <a:p>
-            <a:r>
-              <a:rPr lang="en-US" dirty="0"/>
-              <a:t>DKIM allows the signer to distinguish its legitimate mail stream. It does not directly prevent or disclose abusive behavior. </a:t>
-            </a:r>
-            <a:endParaRPr lang="en-US" dirty="0" smtClean="0"/>
-          </a:p>
-          <a:p>
-            <a:r>
-              <a:rPr lang="en-US" dirty="0" smtClean="0"/>
-              <a:t>This </a:t>
-            </a:r>
-            <a:r>
-              <a:rPr lang="en-US" dirty="0"/>
-              <a:t>ability to distinguish legitimate mail from potentially forged mail has benefits for recipients of e-mail as well as senders, and "DKIM awareness" is programmed into some e-mail software.</a:t>
-            </a:r>
-          </a:p>
-          <a:p>
-            <a:endParaRPr lang="en-US" dirty="0"/>
-          </a:p>
-        </p:txBody>
-      </p:sp>
-    </p:spTree>
-    <p:extLst>
-      <p:ext uri="{BB962C8B-B14F-4D97-AF65-F5344CB8AC3E}">
-        <p14:creationId xmlns:p14="http://schemas.microsoft.com/office/powerpoint/2010/main" val="2074389447"/>
-      </p:ext>
-    </p:extLst>
-  </p:cSld>
-  <p:clrMapOvr>
-    <a:masterClrMapping/>
-  </p:clrMapOvr>
-</p:sld>
-</file>
-
-<file path=ppt/slides/slide40.xml><?xml version="1.0" encoding="utf-8"?>
+<file path=ppt/slides/slide41.xml><?xml version="1.0" encoding="utf-8"?>
 <p:sld xmlns:a="http://schemas.openxmlformats.org/drawingml/2006/main" xmlns:r="http://schemas.openxmlformats.org/officeDocument/2006/relationships" xmlns:p="http://schemas.openxmlformats.org/presentationml/2006/main">
   <p:cSld>
     <p:spTree>

</xml_diff>